<commit_message>
Improvements in 05. ASP.NET-Web-Security
</commit_message>
<xml_diff>
--- a/05. ASP.NET-Web-Security/ASP.NET Web Security.pptx
+++ b/05. ASP.NET-Web-Security/ASP.NET Web Security.pptx
@@ -5,10 +5,10 @@
     <p:sldMasterId id="2147483672" r:id="rId1"/>
   </p:sldMasterIdLst>
   <p:notesMasterIdLst>
-    <p:notesMasterId r:id="rId39"/>
+    <p:notesMasterId r:id="rId40"/>
   </p:notesMasterIdLst>
   <p:handoutMasterIdLst>
-    <p:handoutMasterId r:id="rId40"/>
+    <p:handoutMasterId r:id="rId41"/>
   </p:handoutMasterIdLst>
   <p:sldIdLst>
     <p:sldId id="334" r:id="rId2"/>
@@ -45,9 +45,10 @@
     <p:sldId id="392" r:id="rId33"/>
     <p:sldId id="394" r:id="rId34"/>
     <p:sldId id="438" r:id="rId35"/>
-    <p:sldId id="439" r:id="rId36"/>
-    <p:sldId id="380" r:id="rId37"/>
-    <p:sldId id="333" r:id="rId38"/>
+    <p:sldId id="449" r:id="rId36"/>
+    <p:sldId id="439" r:id="rId37"/>
+    <p:sldId id="380" r:id="rId38"/>
+    <p:sldId id="333" r:id="rId39"/>
   </p:sldIdLst>
   <p:sldSz cx="9144000" cy="6858000" type="screen4x3"/>
   <p:notesSz cx="6881813" cy="9296400"/>
@@ -324,7 +325,7 @@
             <a:fld id="{3BF7C7B5-275F-4D1F-9AB4-9255447DBC73}" type="datetimeFigureOut">
               <a:rPr lang="en-US"/>
               <a:pPr/>
-              <a:t>11/8/2014</a:t>
+              <a:t>2/8/2016</a:t>
             </a:fld>
             <a:endParaRPr lang="en-US" dirty="0"/>
           </a:p>
@@ -555,7 +556,7 @@
             <a:fld id="{9B46F231-FB2B-4655-A644-E2477325E686}" type="datetimeFigureOut">
               <a:rPr lang="en-US"/>
               <a:pPr/>
-              <a:t>11/8/2014</a:t>
+              <a:t>2/8/2016</a:t>
             </a:fld>
             <a:endParaRPr lang="en-US" dirty="0"/>
           </a:p>
@@ -2189,7 +2190,7 @@
             <a:fld id="{F21109B2-5A62-4E8C-B5B7-D36E4D026692}" type="datetime1">
               <a:rPr lang="en-US"/>
               <a:pPr/>
-              <a:t>11/8/2014</a:t>
+              <a:t>2/8/2016</a:t>
             </a:fld>
             <a:r>
               <a:rPr lang="en-US"/>
@@ -2353,7 +2354,7 @@
                   <a:spcPct val="100000"/>
                 </a:lnSpc>
               </a:pPr>
-              <a:t>11/8/2014</a:t>
+              <a:t>2/8/2016</a:t>
             </a:fld>
             <a:r>
               <a:rPr lang="en-US" sz="1100" b="0" i="1">
@@ -2609,7 +2610,7 @@
             <a:fld id="{6FB4F6EA-423E-42DF-9292-215E7D886C4E}" type="slidenum">
               <a:rPr lang="en-US" smtClean="0"/>
               <a:pPr/>
-              <a:t>35</a:t>
+              <a:t>36</a:t>
             </a:fld>
             <a:endParaRPr lang="en-US" dirty="0"/>
           </a:p>
@@ -9766,19 +9767,71 @@
           <a:p>
             <a:r>
               <a:rPr lang="en-US" noProof="1"/>
-              <a:t>String sqlQuery = "SELECT * FROM user WHERE name = '" + username </a:t>
+              <a:t>String sqlQuery = "</a:t>
+            </a:r>
+            <a:r>
+              <a:rPr lang="en-US" noProof="1">
+                <a:solidFill>
+                  <a:schemeClr val="accent2">
+                    <a:lumMod val="60000"/>
+                    <a:lumOff val="40000"/>
+                  </a:schemeClr>
+                </a:solidFill>
+              </a:rPr>
+              <a:t>SELECT * FROM user WHERE name = '</a:t>
+            </a:r>
+            <a:r>
+              <a:rPr lang="en-US" noProof="1"/>
+              <a:t>" + username </a:t>
             </a:r>
             <a:r>
               <a:rPr lang="en-US" noProof="1" smtClean="0"/>
-              <a:t>+ "' </a:t>
+              <a:t>+ "</a:t>
+            </a:r>
+            <a:r>
+              <a:rPr lang="en-US" noProof="1" smtClean="0">
+                <a:solidFill>
+                  <a:schemeClr val="accent2">
+                    <a:lumMod val="60000"/>
+                    <a:lumOff val="40000"/>
+                  </a:schemeClr>
+                </a:solidFill>
+              </a:rPr>
+              <a:t>' </a:t>
+            </a:r>
+            <a:r>
+              <a:rPr lang="en-US" noProof="1">
+                <a:solidFill>
+                  <a:schemeClr val="accent2">
+                    <a:lumMod val="60000"/>
+                    <a:lumOff val="40000"/>
+                  </a:schemeClr>
+                </a:solidFill>
+              </a:rPr>
+              <a:t>AND pass='</a:t>
             </a:r>
             <a:r>
               <a:rPr lang="en-US" noProof="1"/>
-              <a:t>AND pass='" + password + </a:t>
+              <a:t>" + password + </a:t>
             </a:r>
             <a:r>
               <a:rPr lang="en-US" noProof="1" smtClean="0"/>
-              <a:t>"'"</a:t>
+              <a:t>"</a:t>
+            </a:r>
+            <a:r>
+              <a:rPr lang="en-US" noProof="1" smtClean="0">
+                <a:solidFill>
+                  <a:schemeClr val="accent2">
+                    <a:lumMod val="60000"/>
+                    <a:lumOff val="40000"/>
+                  </a:schemeClr>
+                </a:solidFill>
+              </a:rPr>
+              <a:t>'</a:t>
+            </a:r>
+            <a:r>
+              <a:rPr lang="en-US" noProof="1" smtClean="0"/>
+              <a:t>"</a:t>
             </a:r>
             <a:endParaRPr lang="en-US" noProof="1"/>
           </a:p>
@@ -18760,8 +18813,8 @@
         </p:nvSpPr>
         <p:spPr bwMode="auto">
           <a:xfrm>
-            <a:off x="609600" y="1651381"/>
-            <a:ext cx="7924800" cy="1114902"/>
+            <a:off x="304800" y="1676400"/>
+            <a:ext cx="8534400" cy="1114902"/>
           </a:xfrm>
           <a:prstGeom prst="rect">
             <a:avLst/>
@@ -18801,7 +18854,7 @@
               <a:buSzPct val="70000"/>
             </a:pPr>
             <a:r>
-              <a:rPr lang="en-US" sz="2100" b="1" noProof="1">
+              <a:rPr lang="en-US" sz="2100" b="1" noProof="1" smtClean="0">
                 <a:solidFill>
                   <a:srgbClr val="8CF4F2"/>
                 </a:solidFill>
@@ -18815,7 +18868,92 @@
                 <a:latin typeface="Consolas" pitchFamily="49" charset="0"/>
                 <a:cs typeface="Consolas" pitchFamily="49" charset="0"/>
               </a:rPr>
-              <a:t>&lt;%-- used for ajax in AddAntiForgeryToken() --%&gt;</a:t>
+              <a:t>&lt;</a:t>
+            </a:r>
+            <a:r>
+              <a:rPr lang="en-US" sz="2100" b="1" noProof="1">
+                <a:solidFill>
+                  <a:srgbClr val="8CF4F2"/>
+                </a:solidFill>
+                <a:effectLst>
+                  <a:outerShdw blurRad="38100" dist="38100" dir="2700000" algn="tl">
+                    <a:srgbClr val="000000">
+                      <a:alpha val="43137"/>
+                    </a:srgbClr>
+                  </a:outerShdw>
+                </a:effectLst>
+                <a:latin typeface="Consolas" pitchFamily="49" charset="0"/>
+                <a:cs typeface="Consolas" pitchFamily="49" charset="0"/>
+              </a:rPr>
+              <a:t>form id="__AjaxAntiForgeryForm" action</a:t>
+            </a:r>
+            <a:r>
+              <a:rPr lang="en-US" sz="2100" b="1" noProof="1" smtClean="0">
+                <a:solidFill>
+                  <a:srgbClr val="8CF4F2"/>
+                </a:solidFill>
+                <a:effectLst>
+                  <a:outerShdw blurRad="38100" dist="38100" dir="2700000" algn="tl">
+                    <a:srgbClr val="000000">
+                      <a:alpha val="43137"/>
+                    </a:srgbClr>
+                  </a:outerShdw>
+                </a:effectLst>
+                <a:latin typeface="Consolas" pitchFamily="49" charset="0"/>
+                <a:cs typeface="Consolas" pitchFamily="49" charset="0"/>
+              </a:rPr>
+              <a:t>="" </a:t>
+            </a:r>
+            <a:r>
+              <a:rPr lang="en-US" sz="2100" b="1" noProof="1" smtClean="0">
+                <a:solidFill>
+                  <a:srgbClr val="8CF4F2"/>
+                </a:solidFill>
+                <a:effectLst>
+                  <a:outerShdw blurRad="38100" dist="38100" dir="2700000" algn="tl">
+                    <a:srgbClr val="000000">
+                      <a:alpha val="43137"/>
+                    </a:srgbClr>
+                  </a:outerShdw>
+                </a:effectLst>
+                <a:latin typeface="Consolas" pitchFamily="49" charset="0"/>
+                <a:cs typeface="Consolas" pitchFamily="49" charset="0"/>
+              </a:rPr>
+              <a:t>method</a:t>
+            </a:r>
+            <a:r>
+              <a:rPr lang="en-US" sz="2100" b="1" noProof="1">
+                <a:solidFill>
+                  <a:srgbClr val="8CF4F2"/>
+                </a:solidFill>
+                <a:effectLst>
+                  <a:outerShdw blurRad="38100" dist="38100" dir="2700000" algn="tl">
+                    <a:srgbClr val="000000">
+                      <a:alpha val="43137"/>
+                    </a:srgbClr>
+                  </a:outerShdw>
+                </a:effectLst>
+                <a:latin typeface="Consolas" pitchFamily="49" charset="0"/>
+                <a:cs typeface="Consolas" pitchFamily="49" charset="0"/>
+              </a:rPr>
+              <a:t>="post</a:t>
+            </a:r>
+            <a:r>
+              <a:rPr lang="en-US" sz="2100" b="1" noProof="1" smtClean="0">
+                <a:solidFill>
+                  <a:srgbClr val="8CF4F2"/>
+                </a:solidFill>
+                <a:effectLst>
+                  <a:outerShdw blurRad="38100" dist="38100" dir="2700000" algn="tl">
+                    <a:srgbClr val="000000">
+                      <a:alpha val="43137"/>
+                    </a:srgbClr>
+                  </a:outerShdw>
+                </a:effectLst>
+                <a:latin typeface="Consolas" pitchFamily="49" charset="0"/>
+                <a:cs typeface="Consolas" pitchFamily="49" charset="0"/>
+              </a:rPr>
+              <a:t>"&gt;</a:t>
             </a:r>
           </a:p>
           <a:p>
@@ -18846,7 +18984,7 @@
                 <a:latin typeface="Consolas" pitchFamily="49" charset="0"/>
                 <a:cs typeface="Consolas" pitchFamily="49" charset="0"/>
               </a:rPr>
-              <a:t>&lt;form id="__AjaxAntiForgeryForm" action</a:t>
+              <a:t> </a:t>
             </a:r>
             <a:r>
               <a:rPr lang="en-US" sz="2100" b="1" noProof="1" smtClean="0">
@@ -18863,7 +19001,58 @@
                 <a:latin typeface="Consolas" pitchFamily="49" charset="0"/>
                 <a:cs typeface="Consolas" pitchFamily="49" charset="0"/>
               </a:rPr>
-              <a:t>="#"</a:t>
+              <a:t>   </a:t>
+            </a:r>
+            <a:r>
+              <a:rPr lang="en-US" sz="2100" b="1" noProof="1" smtClean="0">
+                <a:solidFill>
+                  <a:srgbClr val="8CF4F2"/>
+                </a:solidFill>
+                <a:effectLst>
+                  <a:outerShdw blurRad="38100" dist="38100" dir="2700000" algn="tl">
+                    <a:srgbClr val="000000">
+                      <a:alpha val="43137"/>
+                    </a:srgbClr>
+                  </a:outerShdw>
+                </a:effectLst>
+                <a:latin typeface="Consolas" pitchFamily="49" charset="0"/>
+                <a:cs typeface="Consolas" pitchFamily="49" charset="0"/>
+              </a:rPr>
+              <a:t>&lt;%= </a:t>
+            </a:r>
+            <a:r>
+              <a:rPr lang="en-US" sz="2100" b="1" noProof="1">
+                <a:solidFill>
+                  <a:srgbClr val="8CF4F2"/>
+                </a:solidFill>
+                <a:effectLst>
+                  <a:outerShdw blurRad="38100" dist="38100" dir="2700000" algn="tl">
+                    <a:srgbClr val="000000">
+                      <a:alpha val="43137"/>
+                    </a:srgbClr>
+                  </a:outerShdw>
+                </a:effectLst>
+                <a:latin typeface="Consolas" pitchFamily="49" charset="0"/>
+                <a:cs typeface="Consolas" pitchFamily="49" charset="0"/>
+              </a:rPr>
+              <a:t>Html.AntiForgeryToken</a:t>
+            </a:r>
+            <a:r>
+              <a:rPr lang="en-US" sz="2100" b="1" noProof="1" smtClean="0">
+                <a:solidFill>
+                  <a:srgbClr val="8CF4F2"/>
+                </a:solidFill>
+                <a:effectLst>
+                  <a:outerShdw blurRad="38100" dist="38100" dir="2700000" algn="tl">
+                    <a:srgbClr val="000000">
+                      <a:alpha val="43137"/>
+                    </a:srgbClr>
+                  </a:outerShdw>
+                </a:effectLst>
+                <a:latin typeface="Consolas" pitchFamily="49" charset="0"/>
+                <a:cs typeface="Consolas" pitchFamily="49" charset="0"/>
+              </a:rPr>
+              <a:t>()%&gt;</a:t>
             </a:r>
           </a:p>
           <a:p>
@@ -18880,7 +19069,7 @@
               <a:buSzPct val="70000"/>
             </a:pPr>
             <a:r>
-              <a:rPr lang="en-US" sz="2100" b="1" noProof="1">
+              <a:rPr lang="en-US" sz="2100" b="1" noProof="1" smtClean="0">
                 <a:solidFill>
                   <a:srgbClr val="8CF4F2"/>
                 </a:solidFill>
@@ -18894,10 +19083,10 @@
                 <a:latin typeface="Consolas" pitchFamily="49" charset="0"/>
                 <a:cs typeface="Consolas" pitchFamily="49" charset="0"/>
               </a:rPr>
-              <a:t> </a:t>
-            </a:r>
-            <a:r>
-              <a:rPr lang="en-US" sz="2100" b="1" noProof="1" smtClean="0">
+              <a:t>&lt;/</a:t>
+            </a:r>
+            <a:r>
+              <a:rPr lang="en-US" sz="2100" b="1" noProof="1">
                 <a:solidFill>
                   <a:srgbClr val="8CF4F2"/>
                 </a:solidFill>
@@ -18911,24 +19100,7 @@
                 <a:latin typeface="Consolas" pitchFamily="49" charset="0"/>
                 <a:cs typeface="Consolas" pitchFamily="49" charset="0"/>
               </a:rPr>
-              <a:t> method</a:t>
-            </a:r>
-            <a:r>
-              <a:rPr lang="en-US" sz="2100" b="1" noProof="1">
-                <a:solidFill>
-                  <a:srgbClr val="8CF4F2"/>
-                </a:solidFill>
-                <a:effectLst>
-                  <a:outerShdw blurRad="38100" dist="38100" dir="2700000" algn="tl">
-                    <a:srgbClr val="000000">
-                      <a:alpha val="43137"/>
-                    </a:srgbClr>
-                  </a:outerShdw>
-                </a:effectLst>
-                <a:latin typeface="Consolas" pitchFamily="49" charset="0"/>
-                <a:cs typeface="Consolas" pitchFamily="49" charset="0"/>
-              </a:rPr>
-              <a:t>="post"&gt;&lt;%= Html.AntiForgeryToken()%&gt;&lt;/form&gt; </a:t>
+              <a:t>form&gt; </a:t>
             </a:r>
           </a:p>
         </p:txBody>
@@ -18943,8 +19115,8 @@
         </p:nvSpPr>
         <p:spPr bwMode="auto">
           <a:xfrm>
-            <a:off x="609600" y="3657600"/>
-            <a:ext cx="7924800" cy="2084399"/>
+            <a:off x="304800" y="3575505"/>
+            <a:ext cx="8534400" cy="3053895"/>
           </a:xfrm>
           <a:prstGeom prst="rect">
             <a:avLst/>
@@ -18998,7 +19170,7 @@
                 <a:latin typeface="Consolas" pitchFamily="49" charset="0"/>
                 <a:cs typeface="Consolas" pitchFamily="49" charset="0"/>
               </a:rPr>
-              <a:t>$.ajax({</a:t>
+              <a:t>var form = $('#__AjaxAntiForgeryForm');</a:t>
             </a:r>
           </a:p>
           <a:p>
@@ -19029,7 +19201,7 @@
                 <a:latin typeface="Consolas" pitchFamily="49" charset="0"/>
                 <a:cs typeface="Consolas" pitchFamily="49" charset="0"/>
               </a:rPr>
-              <a:t>  type</a:t>
+              <a:t>var </a:t>
             </a:r>
             <a:r>
               <a:rPr lang="en-US" sz="2100" b="1" noProof="1">
@@ -19046,7 +19218,41 @@
                 <a:latin typeface="Consolas" pitchFamily="49" charset="0"/>
                 <a:cs typeface="Consolas" pitchFamily="49" charset="0"/>
               </a:rPr>
-              <a:t>: "post",</a:t>
+              <a:t>token = $('input[name="__RequestVerificationToken"]', form).</a:t>
+            </a:r>
+            <a:r>
+              <a:rPr lang="en-US" sz="2100" b="1" noProof="1">
+                <a:solidFill>
+                  <a:srgbClr val="8CF4F2"/>
+                </a:solidFill>
+                <a:effectLst>
+                  <a:outerShdw blurRad="38100" dist="38100" dir="2700000" algn="tl">
+                    <a:srgbClr val="000000">
+                      <a:alpha val="43137"/>
+                    </a:srgbClr>
+                  </a:outerShdw>
+                </a:effectLst>
+                <a:latin typeface="Consolas" pitchFamily="49" charset="0"/>
+                <a:cs typeface="Consolas" pitchFamily="49" charset="0"/>
+              </a:rPr>
+              <a:t>val</a:t>
+            </a:r>
+            <a:r>
+              <a:rPr lang="en-US" sz="2100" b="1" noProof="1" smtClean="0">
+                <a:solidFill>
+                  <a:srgbClr val="8CF4F2"/>
+                </a:solidFill>
+                <a:effectLst>
+                  <a:outerShdw blurRad="38100" dist="38100" dir="2700000" algn="tl">
+                    <a:srgbClr val="000000">
+                      <a:alpha val="43137"/>
+                    </a:srgbClr>
+                  </a:outerShdw>
+                </a:effectLst>
+                <a:latin typeface="Consolas" pitchFamily="49" charset="0"/>
+                <a:cs typeface="Consolas" pitchFamily="49" charset="0"/>
+              </a:rPr>
+              <a:t>();</a:t>
             </a:r>
           </a:p>
           <a:p>
@@ -19077,7 +19283,7 @@
                 <a:latin typeface="Consolas" pitchFamily="49" charset="0"/>
                 <a:cs typeface="Consolas" pitchFamily="49" charset="0"/>
               </a:rPr>
-              <a:t>  </a:t>
+              <a:t>$.</a:t>
             </a:r>
             <a:r>
               <a:rPr lang="en-US" sz="2100" b="1" noProof="1">
@@ -19094,7 +19300,24 @@
                 <a:latin typeface="Consolas" pitchFamily="49" charset="0"/>
                 <a:cs typeface="Consolas" pitchFamily="49" charset="0"/>
               </a:rPr>
-              <a:t>dataType: "html",</a:t>
+              <a:t>ajax</a:t>
+            </a:r>
+            <a:r>
+              <a:rPr lang="en-US" sz="2100" b="1" noProof="1" smtClean="0">
+                <a:solidFill>
+                  <a:srgbClr val="8CF4F2"/>
+                </a:solidFill>
+                <a:effectLst>
+                  <a:outerShdw blurRad="38100" dist="38100" dir="2700000" algn="tl">
+                    <a:srgbClr val="000000">
+                      <a:alpha val="43137"/>
+                    </a:srgbClr>
+                  </a:outerShdw>
+                </a:effectLst>
+                <a:latin typeface="Consolas" pitchFamily="49" charset="0"/>
+                <a:cs typeface="Consolas" pitchFamily="49" charset="0"/>
+              </a:rPr>
+              <a:t>({</a:t>
             </a:r>
           </a:p>
           <a:p>
@@ -19111,7 +19334,7 @@
               <a:buSzPct val="70000"/>
             </a:pPr>
             <a:r>
-              <a:rPr lang="en-US" sz="2100" b="1" noProof="1" smtClean="0">
+              <a:rPr lang="en-US" sz="2100" b="1" noProof="1">
                 <a:solidFill>
                   <a:srgbClr val="8CF4F2"/>
                 </a:solidFill>
@@ -19125,10 +19348,10 @@
                 <a:latin typeface="Consolas" pitchFamily="49" charset="0"/>
                 <a:cs typeface="Consolas" pitchFamily="49" charset="0"/>
               </a:rPr>
-              <a:t>  </a:t>
-            </a:r>
-            <a:r>
-              <a:rPr lang="en-US" sz="2100" b="1" noProof="1">
+              <a:t> </a:t>
+            </a:r>
+            <a:r>
+              <a:rPr lang="en-US" sz="2100" b="1" noProof="1" smtClean="0">
                 <a:solidFill>
                   <a:srgbClr val="8CF4F2"/>
                 </a:solidFill>
@@ -19142,10 +19365,10 @@
                 <a:latin typeface="Consolas" pitchFamily="49" charset="0"/>
                 <a:cs typeface="Consolas" pitchFamily="49" charset="0"/>
               </a:rPr>
-              <a:t>url: </a:t>
-            </a:r>
-            <a:r>
-              <a:rPr lang="en-US" sz="2100" b="1" noProof="1" smtClean="0">
+              <a:t>   type</a:t>
+            </a:r>
+            <a:r>
+              <a:rPr lang="en-US" sz="2100" b="1" noProof="1">
                 <a:solidFill>
                   <a:srgbClr val="8CF4F2"/>
                 </a:solidFill>
@@ -19159,22 +19382,8 @@
                 <a:latin typeface="Consolas" pitchFamily="49" charset="0"/>
                 <a:cs typeface="Consolas" pitchFamily="49" charset="0"/>
               </a:rPr>
-              <a:t>…,</a:t>
-            </a:r>
-            <a:endParaRPr lang="en-US" sz="2100" b="1" noProof="1">
-              <a:solidFill>
-                <a:srgbClr val="8CF4F2"/>
-              </a:solidFill>
-              <a:effectLst>
-                <a:outerShdw blurRad="38100" dist="38100" dir="2700000" algn="tl">
-                  <a:srgbClr val="000000">
-                    <a:alpha val="43137"/>
-                  </a:srgbClr>
-                </a:outerShdw>
-              </a:effectLst>
-              <a:latin typeface="Consolas" pitchFamily="49" charset="0"/>
-              <a:cs typeface="Consolas" pitchFamily="49" charset="0"/>
-            </a:endParaRPr>
+              <a:t>: 'POST',</a:t>
+            </a:r>
           </a:p>
           <a:p>
             <a:pPr eaLnBrk="0" hangingPunct="0">
@@ -19190,7 +19399,7 @@
               <a:buSzPct val="70000"/>
             </a:pPr>
             <a:r>
-              <a:rPr lang="en-US" sz="2100" b="1" noProof="1" smtClean="0">
+              <a:rPr lang="en-US" sz="2100" b="1" noProof="1">
                 <a:solidFill>
                   <a:srgbClr val="8CF4F2"/>
                 </a:solidFill>
@@ -19204,10 +19413,10 @@
                 <a:latin typeface="Consolas" pitchFamily="49" charset="0"/>
                 <a:cs typeface="Consolas" pitchFamily="49" charset="0"/>
               </a:rPr>
-              <a:t>  </a:t>
-            </a:r>
-            <a:r>
-              <a:rPr lang="en-US" sz="2100" b="1" noProof="1">
+              <a:t>    </a:t>
+            </a:r>
+            <a:r>
+              <a:rPr lang="en-US" sz="2100" b="1" noProof="1" smtClean="0">
                 <a:solidFill>
                   <a:srgbClr val="8CF4F2"/>
                 </a:solidFill>
@@ -19221,10 +19430,10 @@
                 <a:latin typeface="Consolas" pitchFamily="49" charset="0"/>
                 <a:cs typeface="Consolas" pitchFamily="49" charset="0"/>
               </a:rPr>
-              <a:t>data: AddAntiForgeryToken({ </a:t>
-            </a:r>
-            <a:r>
-              <a:rPr lang="en-US" sz="2100" b="1" noProof="1" smtClean="0">
+              <a:t>data</a:t>
+            </a:r>
+            <a:r>
+              <a:rPr lang="en-US" sz="2100" b="1" noProof="1">
                 <a:solidFill>
                   <a:srgbClr val="8CF4F2"/>
                 </a:solidFill>
@@ -19238,7 +19447,7 @@
                 <a:latin typeface="Consolas" pitchFamily="49" charset="0"/>
                 <a:cs typeface="Consolas" pitchFamily="49" charset="0"/>
               </a:rPr>
-              <a:t>some-data })</a:t>
+              <a:t>: { </a:t>
             </a:r>
           </a:p>
           <a:p>
@@ -19255,7 +19464,7 @@
               <a:buSzPct val="70000"/>
             </a:pPr>
             <a:r>
-              <a:rPr lang="en-US" sz="2100" b="1" noProof="1" smtClean="0">
+              <a:rPr lang="en-US" sz="2100" b="1" noProof="1">
                 <a:solidFill>
                   <a:srgbClr val="8CF4F2"/>
                 </a:solidFill>
@@ -19269,7 +19478,154 @@
                 <a:latin typeface="Consolas" pitchFamily="49" charset="0"/>
                 <a:cs typeface="Consolas" pitchFamily="49" charset="0"/>
               </a:rPr>
-              <a:t>});</a:t>
+              <a:t>    </a:t>
+            </a:r>
+            <a:r>
+              <a:rPr lang="en-US" sz="2100" b="1" noProof="1" smtClean="0">
+                <a:solidFill>
+                  <a:srgbClr val="8CF4F2"/>
+                </a:solidFill>
+                <a:effectLst>
+                  <a:outerShdw blurRad="38100" dist="38100" dir="2700000" algn="tl">
+                    <a:srgbClr val="000000">
+                      <a:alpha val="43137"/>
+                    </a:srgbClr>
+                  </a:outerShdw>
+                </a:effectLst>
+                <a:latin typeface="Consolas" pitchFamily="49" charset="0"/>
+                <a:cs typeface="Consolas" pitchFamily="49" charset="0"/>
+              </a:rPr>
+              <a:t>__</a:t>
+            </a:r>
+            <a:r>
+              <a:rPr lang="en-US" sz="2100" b="1" noProof="1">
+                <a:solidFill>
+                  <a:srgbClr val="8CF4F2"/>
+                </a:solidFill>
+                <a:effectLst>
+                  <a:outerShdw blurRad="38100" dist="38100" dir="2700000" algn="tl">
+                    <a:srgbClr val="000000">
+                      <a:alpha val="43137"/>
+                    </a:srgbClr>
+                  </a:outerShdw>
+                </a:effectLst>
+                <a:latin typeface="Consolas" pitchFamily="49" charset="0"/>
+                <a:cs typeface="Consolas" pitchFamily="49" charset="0"/>
+              </a:rPr>
+              <a:t>RequestVerificationToken: token, </a:t>
+            </a:r>
+          </a:p>
+          <a:p>
+            <a:pPr eaLnBrk="0" hangingPunct="0">
+              <a:spcBef>
+                <a:spcPts val="0"/>
+              </a:spcBef>
+              <a:buClr>
+                <a:schemeClr val="accent5">
+                  <a:lumMod val="40000"/>
+                  <a:lumOff val="60000"/>
+                </a:schemeClr>
+              </a:buClr>
+              <a:buSzPct val="70000"/>
+            </a:pPr>
+            <a:r>
+              <a:rPr lang="en-US" sz="2100" b="1" noProof="1" smtClean="0">
+                <a:solidFill>
+                  <a:srgbClr val="8CF4F2"/>
+                </a:solidFill>
+                <a:effectLst>
+                  <a:outerShdw blurRad="38100" dist="38100" dir="2700000" algn="tl">
+                    <a:srgbClr val="000000">
+                      <a:alpha val="43137"/>
+                    </a:srgbClr>
+                  </a:outerShdw>
+                </a:effectLst>
+                <a:latin typeface="Consolas" pitchFamily="49" charset="0"/>
+                <a:cs typeface="Consolas" pitchFamily="49" charset="0"/>
+              </a:rPr>
+              <a:t>    someValue</a:t>
+            </a:r>
+            <a:r>
+              <a:rPr lang="en-US" sz="2100" b="1" noProof="1">
+                <a:solidFill>
+                  <a:srgbClr val="8CF4F2"/>
+                </a:solidFill>
+                <a:effectLst>
+                  <a:outerShdw blurRad="38100" dist="38100" dir="2700000" algn="tl">
+                    <a:srgbClr val="000000">
+                      <a:alpha val="43137"/>
+                    </a:srgbClr>
+                  </a:outerShdw>
+                </a:effectLst>
+                <a:latin typeface="Consolas" pitchFamily="49" charset="0"/>
+                <a:cs typeface="Consolas" pitchFamily="49" charset="0"/>
+              </a:rPr>
+              <a:t>: </a:t>
+            </a:r>
+            <a:r>
+              <a:rPr lang="en-US" sz="2100" b="1" noProof="1">
+                <a:solidFill>
+                  <a:srgbClr val="8CF4F2"/>
+                </a:solidFill>
+                <a:effectLst>
+                  <a:outerShdw blurRad="38100" dist="38100" dir="2700000" algn="tl">
+                    <a:srgbClr val="000000">
+                      <a:alpha val="43137"/>
+                    </a:srgbClr>
+                  </a:outerShdw>
+                </a:effectLst>
+                <a:latin typeface="Consolas" pitchFamily="49" charset="0"/>
+                <a:cs typeface="Consolas" pitchFamily="49" charset="0"/>
+              </a:rPr>
+              <a:t>'some </a:t>
+            </a:r>
+            <a:r>
+              <a:rPr lang="en-US" sz="2100" b="1" noProof="1" smtClean="0">
+                <a:solidFill>
+                  <a:srgbClr val="8CF4F2"/>
+                </a:solidFill>
+                <a:effectLst>
+                  <a:outerShdw blurRad="38100" dist="38100" dir="2700000" algn="tl">
+                    <a:srgbClr val="000000">
+                      <a:alpha val="43137"/>
+                    </a:srgbClr>
+                  </a:outerShdw>
+                </a:effectLst>
+                <a:latin typeface="Consolas" pitchFamily="49" charset="0"/>
+                <a:cs typeface="Consolas" pitchFamily="49" charset="0"/>
+              </a:rPr>
+              <a:t>value'</a:t>
+            </a:r>
+          </a:p>
+          <a:p>
+            <a:pPr eaLnBrk="0" hangingPunct="0">
+              <a:spcBef>
+                <a:spcPts val="0"/>
+              </a:spcBef>
+              <a:buClr>
+                <a:schemeClr val="accent5">
+                  <a:lumMod val="40000"/>
+                  <a:lumOff val="60000"/>
+                </a:schemeClr>
+              </a:buClr>
+              <a:buSzPct val="70000"/>
+            </a:pPr>
+            <a:r>
+              <a:rPr lang="en-US" sz="2100" b="1" noProof="1" smtClean="0">
+                <a:solidFill>
+                  <a:srgbClr val="8CF4F2"/>
+                </a:solidFill>
+                <a:effectLst>
+                  <a:outerShdw blurRad="38100" dist="38100" dir="2700000" algn="tl">
+                    <a:srgbClr val="000000">
+                      <a:alpha val="43137"/>
+                    </a:srgbClr>
+                  </a:outerShdw>
+                </a:effectLst>
+                <a:latin typeface="Consolas" pitchFamily="49" charset="0"/>
+                <a:cs typeface="Consolas" pitchFamily="49" charset="0"/>
+              </a:rPr>
+              <a:t>},</a:t>
             </a:r>
             <a:endParaRPr lang="en-US" sz="2100" b="1" noProof="1">
               <a:solidFill>
@@ -19748,11 +20104,15 @@
                 <a:latin typeface="Consolas" panose="020B0609020204030204" pitchFamily="49" charset="0"/>
                 <a:cs typeface="Consolas" panose="020B0609020204030204" pitchFamily="49" charset="0"/>
               </a:rPr>
-              <a:t>2013</a:t>
+              <a:t>2015</a:t>
             </a:r>
             <a:r>
               <a:rPr lang="en-US" sz="3000" dirty="0" smtClean="0"/>
-              <a:t> Web Forms app template, there is already CSRF protection in </a:t>
+              <a:t> </a:t>
+            </a:r>
+            <a:r>
+              <a:rPr lang="en-US" sz="3000" dirty="0" smtClean="0"/>
+              <a:t>Web Forms app template, there is already CSRF protection in </a:t>
             </a:r>
             <a:r>
               <a:rPr lang="en-US" sz="3000" noProof="1" smtClean="0">
@@ -19896,7 +20256,41 @@
                 <a:latin typeface="Consolas" pitchFamily="49" charset="0"/>
                 <a:cs typeface="Consolas" pitchFamily="49" charset="0"/>
               </a:rPr>
-              <a:t>  base.OnInit(e</a:t>
+              <a:t> </a:t>
+            </a:r>
+            <a:r>
+              <a:rPr lang="en-US" sz="2000" b="1" noProof="1" smtClean="0">
+                <a:solidFill>
+                  <a:srgbClr val="8CF4F2"/>
+                </a:solidFill>
+                <a:effectLst>
+                  <a:outerShdw blurRad="38100" dist="38100" dir="2700000" algn="tl">
+                    <a:srgbClr val="000000">
+                      <a:alpha val="43137"/>
+                    </a:srgbClr>
+                  </a:outerShdw>
+                </a:effectLst>
+                <a:latin typeface="Consolas" pitchFamily="49" charset="0"/>
+                <a:cs typeface="Consolas" pitchFamily="49" charset="0"/>
+              </a:rPr>
+              <a:t>  </a:t>
+            </a:r>
+            <a:r>
+              <a:rPr lang="en-US" sz="2000" b="1" noProof="1" smtClean="0">
+                <a:solidFill>
+                  <a:srgbClr val="8CF4F2"/>
+                </a:solidFill>
+                <a:effectLst>
+                  <a:outerShdw blurRad="38100" dist="38100" dir="2700000" algn="tl">
+                    <a:srgbClr val="000000">
+                      <a:alpha val="43137"/>
+                    </a:srgbClr>
+                  </a:outerShdw>
+                </a:effectLst>
+                <a:latin typeface="Consolas" pitchFamily="49" charset="0"/>
+                <a:cs typeface="Consolas" pitchFamily="49" charset="0"/>
+              </a:rPr>
+              <a:t>base.OnInit(e</a:t>
             </a:r>
             <a:r>
               <a:rPr lang="en-US" sz="2000" b="1" noProof="1">
@@ -19944,7 +20338,24 @@
                 <a:latin typeface="Consolas" pitchFamily="49" charset="0"/>
                 <a:cs typeface="Consolas" pitchFamily="49" charset="0"/>
               </a:rPr>
-              <a:t>  if </a:t>
+              <a:t>   </a:t>
+            </a:r>
+            <a:r>
+              <a:rPr lang="en-US" sz="2000" b="1" noProof="1" smtClean="0">
+                <a:solidFill>
+                  <a:srgbClr val="8CF4F2"/>
+                </a:solidFill>
+                <a:effectLst>
+                  <a:outerShdw blurRad="38100" dist="38100" dir="2700000" algn="tl">
+                    <a:srgbClr val="000000">
+                      <a:alpha val="43137"/>
+                    </a:srgbClr>
+                  </a:outerShdw>
+                </a:effectLst>
+                <a:latin typeface="Consolas" pitchFamily="49" charset="0"/>
+                <a:cs typeface="Consolas" pitchFamily="49" charset="0"/>
+              </a:rPr>
+              <a:t>if </a:t>
             </a:r>
             <a:r>
               <a:rPr lang="en-US" sz="2000" b="1" noProof="1">
@@ -19992,7 +20403,41 @@
                 <a:latin typeface="Consolas" pitchFamily="49" charset="0"/>
                 <a:cs typeface="Consolas" pitchFamily="49" charset="0"/>
               </a:rPr>
-              <a:t>  {</a:t>
+              <a:t> </a:t>
+            </a:r>
+            <a:r>
+              <a:rPr lang="en-US" sz="2000" b="1" noProof="1" smtClean="0">
+                <a:solidFill>
+                  <a:srgbClr val="8CF4F2"/>
+                </a:solidFill>
+                <a:effectLst>
+                  <a:outerShdw blurRad="38100" dist="38100" dir="2700000" algn="tl">
+                    <a:srgbClr val="000000">
+                      <a:alpha val="43137"/>
+                    </a:srgbClr>
+                  </a:outerShdw>
+                </a:effectLst>
+                <a:latin typeface="Consolas" pitchFamily="49" charset="0"/>
+                <a:cs typeface="Consolas" pitchFamily="49" charset="0"/>
+              </a:rPr>
+              <a:t>  </a:t>
+            </a:r>
+            <a:r>
+              <a:rPr lang="en-US" sz="2000" b="1" noProof="1" smtClean="0">
+                <a:solidFill>
+                  <a:srgbClr val="8CF4F2"/>
+                </a:solidFill>
+                <a:effectLst>
+                  <a:outerShdw blurRad="38100" dist="38100" dir="2700000" algn="tl">
+                    <a:srgbClr val="000000">
+                      <a:alpha val="43137"/>
+                    </a:srgbClr>
+                  </a:outerShdw>
+                </a:effectLst>
+                <a:latin typeface="Consolas" pitchFamily="49" charset="0"/>
+                <a:cs typeface="Consolas" pitchFamily="49" charset="0"/>
+              </a:rPr>
+              <a:t>{</a:t>
             </a:r>
             <a:endParaRPr lang="en-US" sz="2000" b="1" noProof="1">
               <a:solidFill>
@@ -20037,7 +20482,41 @@
                 <a:latin typeface="Consolas" pitchFamily="49" charset="0"/>
                 <a:cs typeface="Consolas" pitchFamily="49" charset="0"/>
               </a:rPr>
-              <a:t>    Page.ViewStateUserKey </a:t>
+              <a:t> </a:t>
+            </a:r>
+            <a:r>
+              <a:rPr lang="en-US" sz="2000" b="1" noProof="1" smtClean="0">
+                <a:solidFill>
+                  <a:srgbClr val="8CF4F2"/>
+                </a:solidFill>
+                <a:effectLst>
+                  <a:outerShdw blurRad="38100" dist="38100" dir="2700000" algn="tl">
+                    <a:srgbClr val="000000">
+                      <a:alpha val="43137"/>
+                    </a:srgbClr>
+                  </a:outerShdw>
+                </a:effectLst>
+                <a:latin typeface="Consolas" pitchFamily="49" charset="0"/>
+                <a:cs typeface="Consolas" pitchFamily="49" charset="0"/>
+              </a:rPr>
+              <a:t>     </a:t>
+            </a:r>
+            <a:r>
+              <a:rPr lang="en-US" sz="2000" b="1" noProof="1" smtClean="0">
+                <a:solidFill>
+                  <a:srgbClr val="8CF4F2"/>
+                </a:solidFill>
+                <a:effectLst>
+                  <a:outerShdw blurRad="38100" dist="38100" dir="2700000" algn="tl">
+                    <a:srgbClr val="000000">
+                      <a:alpha val="43137"/>
+                    </a:srgbClr>
+                  </a:outerShdw>
+                </a:effectLst>
+                <a:latin typeface="Consolas" pitchFamily="49" charset="0"/>
+                <a:cs typeface="Consolas" pitchFamily="49" charset="0"/>
+              </a:rPr>
+              <a:t>Page.ViewStateUserKey </a:t>
             </a:r>
             <a:r>
               <a:rPr lang="en-US" sz="2000" b="1" noProof="1">
@@ -20085,7 +20564,41 @@
                 <a:latin typeface="Consolas" pitchFamily="49" charset="0"/>
                 <a:cs typeface="Consolas" pitchFamily="49" charset="0"/>
               </a:rPr>
-              <a:t>  }</a:t>
+              <a:t> </a:t>
+            </a:r>
+            <a:r>
+              <a:rPr lang="en-US" sz="2000" b="1" noProof="1" smtClean="0">
+                <a:solidFill>
+                  <a:srgbClr val="8CF4F2"/>
+                </a:solidFill>
+                <a:effectLst>
+                  <a:outerShdw blurRad="38100" dist="38100" dir="2700000" algn="tl">
+                    <a:srgbClr val="000000">
+                      <a:alpha val="43137"/>
+                    </a:srgbClr>
+                  </a:outerShdw>
+                </a:effectLst>
+                <a:latin typeface="Consolas" pitchFamily="49" charset="0"/>
+                <a:cs typeface="Consolas" pitchFamily="49" charset="0"/>
+              </a:rPr>
+              <a:t>  </a:t>
+            </a:r>
+            <a:r>
+              <a:rPr lang="en-US" sz="2000" b="1" noProof="1" smtClean="0">
+                <a:solidFill>
+                  <a:srgbClr val="8CF4F2"/>
+                </a:solidFill>
+                <a:effectLst>
+                  <a:outerShdw blurRad="38100" dist="38100" dir="2700000" algn="tl">
+                    <a:srgbClr val="000000">
+                      <a:alpha val="43137"/>
+                    </a:srgbClr>
+                  </a:outerShdw>
+                </a:effectLst>
+                <a:latin typeface="Consolas" pitchFamily="49" charset="0"/>
+                <a:cs typeface="Consolas" pitchFamily="49" charset="0"/>
+              </a:rPr>
+              <a:t>}</a:t>
             </a:r>
             <a:endParaRPr lang="en-US" sz="2000" b="1" noProof="1">
               <a:solidFill>
@@ -20683,6 +21196,211 @@
       </p:grpSpPr>
       <p:sp>
         <p:nvSpPr>
+          <p:cNvPr id="2" name="Title 1"/>
+          <p:cNvSpPr>
+            <a:spLocks noGrp="1"/>
+          </p:cNvSpPr>
+          <p:nvPr>
+            <p:ph type="title"/>
+          </p:nvPr>
+        </p:nvSpPr>
+        <p:spPr/>
+        <p:txBody>
+          <a:bodyPr/>
+          <a:lstStyle/>
+          <a:p>
+            <a:r>
+              <a:rPr lang="en-US" dirty="0"/>
+              <a:t>Zero-day Vulnerabilities</a:t>
+            </a:r>
+            <a:endParaRPr lang="en-US" dirty="0"/>
+          </a:p>
+        </p:txBody>
+      </p:sp>
+      <p:sp>
+        <p:nvSpPr>
+          <p:cNvPr id="3" name="Content Placeholder 2"/>
+          <p:cNvSpPr>
+            <a:spLocks noGrp="1"/>
+          </p:cNvSpPr>
+          <p:nvPr>
+            <p:ph idx="1"/>
+          </p:nvPr>
+        </p:nvSpPr>
+        <p:spPr/>
+        <p:txBody>
+          <a:bodyPr/>
+          <a:lstStyle/>
+          <a:p>
+            <a:r>
+              <a:rPr lang="en-US" dirty="0" smtClean="0"/>
+              <a:t>Previously </a:t>
+            </a:r>
+            <a:r>
+              <a:rPr lang="en-US" dirty="0"/>
+              <a:t>undisclosed computer-software vulnerability that hackers can </a:t>
+            </a:r>
+            <a:r>
+              <a:rPr lang="en-US" dirty="0" smtClean="0"/>
+              <a:t>exploit</a:t>
+            </a:r>
+          </a:p>
+          <a:p>
+            <a:r>
+              <a:rPr lang="en-US" dirty="0" smtClean="0"/>
+              <a:t>Know as </a:t>
+            </a:r>
+            <a:r>
+              <a:rPr lang="en-US" dirty="0"/>
+              <a:t>"zero-day" because once the flaw becomes known, the software's author has zero days in which to plan </a:t>
+            </a:r>
+            <a:r>
+              <a:rPr lang="en-US" dirty="0" smtClean="0"/>
+              <a:t>any mitigation</a:t>
+            </a:r>
+          </a:p>
+          <a:p>
+            <a:r>
+              <a:rPr lang="en-US" dirty="0">
+                <a:hlinkClick r:id="rId2"/>
+              </a:rPr>
+              <a:t>https://www.exploit-db.com</a:t>
+            </a:r>
+            <a:r>
+              <a:rPr lang="en-US" dirty="0" smtClean="0">
+                <a:hlinkClick r:id="rId2"/>
+              </a:rPr>
+              <a:t>/</a:t>
+            </a:r>
+            <a:endParaRPr lang="en-US" dirty="0" smtClean="0"/>
+          </a:p>
+          <a:p>
+            <a:pPr lvl="1"/>
+            <a:r>
+              <a:rPr lang="en-US" dirty="0" smtClean="0">
+                <a:hlinkClick r:id="rId3"/>
+              </a:rPr>
+              <a:t>https</a:t>
+            </a:r>
+            <a:r>
+              <a:rPr lang="en-US" dirty="0">
+                <a:hlinkClick r:id="rId3"/>
+              </a:rPr>
+              <a:t>://www.exploit-db.com/exploits/39150</a:t>
+            </a:r>
+            <a:r>
+              <a:rPr lang="en-US" dirty="0" smtClean="0">
+                <a:hlinkClick r:id="rId3"/>
+              </a:rPr>
+              <a:t>/</a:t>
+            </a:r>
+            <a:endParaRPr lang="en-US" dirty="0" smtClean="0"/>
+          </a:p>
+          <a:p>
+            <a:pPr lvl="1"/>
+            <a:r>
+              <a:rPr lang="en-US" dirty="0">
+                <a:hlinkClick r:id="rId4"/>
+              </a:rPr>
+              <a:t>https</a:t>
+            </a:r>
+            <a:r>
+              <a:rPr lang="en-US" dirty="0" smtClean="0">
+                <a:hlinkClick r:id="rId4"/>
+              </a:rPr>
+              <a:t>://youtube.com/watch?v=43DVOq5L2hw</a:t>
+            </a:r>
+            <a:endParaRPr lang="en-US" dirty="0" smtClean="0"/>
+          </a:p>
+          <a:p>
+            <a:pPr lvl="1"/>
+            <a:r>
+              <a:rPr lang="en-US" dirty="0" smtClean="0">
+                <a:hlinkClick r:id="rId5"/>
+              </a:rPr>
+              <a:t>https</a:t>
+            </a:r>
+            <a:r>
+              <a:rPr lang="en-US" dirty="0">
+                <a:hlinkClick r:id="rId5"/>
+              </a:rPr>
+              <a:t>://www.exploit-db.com/exploits/38223</a:t>
+            </a:r>
+            <a:r>
+              <a:rPr lang="en-US" dirty="0" smtClean="0">
+                <a:hlinkClick r:id="rId5"/>
+              </a:rPr>
+              <a:t>/</a:t>
+            </a:r>
+            <a:endParaRPr lang="en-US" dirty="0" smtClean="0"/>
+          </a:p>
+          <a:p>
+            <a:pPr lvl="1"/>
+            <a:endParaRPr lang="en-US" dirty="0"/>
+          </a:p>
+        </p:txBody>
+      </p:sp>
+      <p:sp>
+        <p:nvSpPr>
+          <p:cNvPr id="4" name="Slide Number Placeholder 3"/>
+          <p:cNvSpPr>
+            <a:spLocks noGrp="1"/>
+          </p:cNvSpPr>
+          <p:nvPr>
+            <p:ph type="sldNum" sz="quarter" idx="10"/>
+          </p:nvPr>
+        </p:nvSpPr>
+        <p:spPr/>
+        <p:txBody>
+          <a:bodyPr/>
+          <a:lstStyle/>
+          <a:p>
+            <a:pPr>
+              <a:defRPr/>
+            </a:pPr>
+            <a:fld id="{58452FF4-89E3-4D1B-9927-2DBDC00E58D7}" type="slidenum">
+              <a:rPr lang="en-US" smtClean="0"/>
+              <a:pPr>
+                <a:defRPr/>
+              </a:pPr>
+              <a:t>35</a:t>
+            </a:fld>
+            <a:endParaRPr lang="en-US" dirty="0"/>
+          </a:p>
+        </p:txBody>
+      </p:sp>
+    </p:spTree>
+    <p:extLst>
+      <p:ext uri="{BB962C8B-B14F-4D97-AF65-F5344CB8AC3E}">
+        <p14:creationId xmlns:p14="http://schemas.microsoft.com/office/powerpoint/2010/main" val="2390653881"/>
+      </p:ext>
+    </p:extLst>
+  </p:cSld>
+  <p:clrMapOvr>
+    <a:masterClrMapping/>
+  </p:clrMapOvr>
+</p:sld>
+</file>
+
+<file path=ppt/slides/slide36.xml><?xml version="1.0" encoding="utf-8"?>
+<p:sld xmlns:a="http://schemas.openxmlformats.org/drawingml/2006/main" xmlns:r="http://schemas.openxmlformats.org/officeDocument/2006/relationships" xmlns:p="http://schemas.openxmlformats.org/presentationml/2006/main">
+  <p:cSld>
+    <p:spTree>
+      <p:nvGrpSpPr>
+        <p:cNvPr id="1" name=""/>
+        <p:cNvGrpSpPr/>
+        <p:nvPr/>
+      </p:nvGrpSpPr>
+      <p:grpSpPr>
+        <a:xfrm>
+          <a:off x="0" y="0"/>
+          <a:ext cx="0" cy="0"/>
+          <a:chOff x="0" y="0"/>
+          <a:chExt cx="0" cy="0"/>
+        </a:xfrm>
+      </p:grpSpPr>
+      <p:sp>
+        <p:nvSpPr>
           <p:cNvPr id="4" name="Title 3"/>
           <p:cNvSpPr>
             <a:spLocks noGrp="1"/>
@@ -20716,8 +21434,8 @@
         </p:nvSpPr>
         <p:spPr>
           <a:xfrm>
-            <a:off x="228600" y="762000"/>
-            <a:ext cx="8686800" cy="5791200"/>
+            <a:off x="228600" y="685800"/>
+            <a:ext cx="8686800" cy="5867400"/>
           </a:xfrm>
         </p:spPr>
         <p:txBody>
@@ -20778,10 +21496,9 @@
               <a:t>MiTM</a:t>
             </a:r>
             <a:r>
-              <a:rPr lang="en-US" smtClean="0"/>
+              <a:rPr lang="en-US" dirty="0" smtClean="0"/>
               <a:t>)</a:t>
             </a:r>
-            <a:endParaRPr lang="en-US" dirty="0" smtClean="0"/>
           </a:p>
           <a:p>
             <a:pPr lvl="1">
@@ -20986,7 +21703,7 @@
               <a:pPr>
                 <a:defRPr/>
               </a:pPr>
-              <a:t>35</a:t>
+              <a:t>36</a:t>
             </a:fld>
             <a:endParaRPr lang="en-US" dirty="0"/>
           </a:p>
@@ -21005,7 +21722,7 @@
 </p:sld>
 </file>
 
-<file path=ppt/slides/slide36.xml><?xml version="1.0" encoding="utf-8"?>
+<file path=ppt/slides/slide37.xml><?xml version="1.0" encoding="utf-8"?>
 <p:sld xmlns:a="http://schemas.openxmlformats.org/drawingml/2006/main" xmlns:r="http://schemas.openxmlformats.org/officeDocument/2006/relationships" xmlns:p="http://schemas.openxmlformats.org/presentationml/2006/main">
   <p:cSld>
     <p:spTree>
@@ -21097,7 +21814,7 @@
 </p:sld>
 </file>
 
-<file path=ppt/slides/slide37.xml><?xml version="1.0" encoding="utf-8"?>
+<file path=ppt/slides/slide38.xml><?xml version="1.0" encoding="utf-8"?>
 <p:sld xmlns:a="http://schemas.openxmlformats.org/drawingml/2006/main" xmlns:r="http://schemas.openxmlformats.org/officeDocument/2006/relationships" xmlns:p="http://schemas.openxmlformats.org/presentationml/2006/main">
   <p:cSld>
     <p:spTree>
@@ -21588,7 +22305,7 @@
               <a:pPr>
                 <a:defRPr/>
               </a:pPr>
-              <a:t>37</a:t>
+              <a:t>38</a:t>
             </a:fld>
             <a:endParaRPr lang="en-US" dirty="0"/>
           </a:p>
@@ -24051,7 +24768,7 @@
                 <a:cs typeface="Consolas" pitchFamily="49" charset="0"/>
                 <a:sym typeface="Wingdings" pitchFamily="2" charset="2"/>
               </a:rPr>
-              <a:t>nakov</a:t>
+              <a:t>Nikolay.IT</a:t>
             </a:r>
             <a:r>
               <a:rPr lang="en-US" sz="1800" b="1" noProof="1" smtClean="0">

</xml_diff>